<commit_message>
Update for transferal to new machine
</commit_message>
<xml_diff>
--- a/modules/05-techs/git/git-github.pptx
+++ b/modules/05-techs/git/git-github.pptx
@@ -229,7 +229,7 @@
           <a:p>
             <a:fld id="{DA0C7814-E88F-4950-86D3-79AE830CE9F6}" type="datetimeFigureOut">
               <a:rPr lang="en-GB" smtClean="0"/>
-              <a:t>29/06/2021</a:t>
+              <a:t>23/12/2024</a:t>
             </a:fld>
             <a:endParaRPr lang="en-GB"/>
           </a:p>
@@ -914,7 +914,7 @@
           <a:p>
             <a:fld id="{0B6C7CDF-7AA5-44C3-B1A8-9A6C0AE19615}" type="datetimeFigureOut">
               <a:rPr lang="en-GB" smtClean="0"/>
-              <a:t>29/06/2021</a:t>
+              <a:t>23/12/2024</a:t>
             </a:fld>
             <a:endParaRPr lang="en-GB"/>
           </a:p>
@@ -1084,7 +1084,7 @@
           <a:p>
             <a:fld id="{0B6C7CDF-7AA5-44C3-B1A8-9A6C0AE19615}" type="datetimeFigureOut">
               <a:rPr lang="en-GB" smtClean="0"/>
-              <a:t>29/06/2021</a:t>
+              <a:t>23/12/2024</a:t>
             </a:fld>
             <a:endParaRPr lang="en-GB"/>
           </a:p>
@@ -1264,7 +1264,7 @@
           <a:p>
             <a:fld id="{0B6C7CDF-7AA5-44C3-B1A8-9A6C0AE19615}" type="datetimeFigureOut">
               <a:rPr lang="en-GB" smtClean="0"/>
-              <a:t>29/06/2021</a:t>
+              <a:t>23/12/2024</a:t>
             </a:fld>
             <a:endParaRPr lang="en-GB"/>
           </a:p>
@@ -1474,7 +1474,7 @@
           <a:p>
             <a:fld id="{4B916772-B494-41CE-A259-ACCA1FC5E078}" type="datetimeFigureOut">
               <a:rPr lang="en-GB" smtClean="0"/>
-              <a:t>29/06/2021</a:t>
+              <a:t>23/12/2024</a:t>
             </a:fld>
             <a:endParaRPr lang="en-GB"/>
           </a:p>
@@ -1674,7 +1674,7 @@
           <a:p>
             <a:fld id="{4B916772-B494-41CE-A259-ACCA1FC5E078}" type="datetimeFigureOut">
               <a:rPr lang="en-GB" smtClean="0"/>
-              <a:t>29/06/2021</a:t>
+              <a:t>23/12/2024</a:t>
             </a:fld>
             <a:endParaRPr lang="en-GB"/>
           </a:p>
@@ -1950,7 +1950,7 @@
           <a:p>
             <a:fld id="{4B916772-B494-41CE-A259-ACCA1FC5E078}" type="datetimeFigureOut">
               <a:rPr lang="en-GB" smtClean="0"/>
-              <a:t>29/06/2021</a:t>
+              <a:t>23/12/2024</a:t>
             </a:fld>
             <a:endParaRPr lang="en-GB"/>
           </a:p>
@@ -2218,7 +2218,7 @@
           <a:p>
             <a:fld id="{4B916772-B494-41CE-A259-ACCA1FC5E078}" type="datetimeFigureOut">
               <a:rPr lang="en-GB" smtClean="0"/>
-              <a:t>29/06/2021</a:t>
+              <a:t>23/12/2024</a:t>
             </a:fld>
             <a:endParaRPr lang="en-GB"/>
           </a:p>
@@ -2633,7 +2633,7 @@
           <a:p>
             <a:fld id="{4B916772-B494-41CE-A259-ACCA1FC5E078}" type="datetimeFigureOut">
               <a:rPr lang="en-GB" smtClean="0"/>
-              <a:t>29/06/2021</a:t>
+              <a:t>23/12/2024</a:t>
             </a:fld>
             <a:endParaRPr lang="en-GB"/>
           </a:p>
@@ -2775,7 +2775,7 @@
           <a:p>
             <a:fld id="{4B916772-B494-41CE-A259-ACCA1FC5E078}" type="datetimeFigureOut">
               <a:rPr lang="en-GB" smtClean="0"/>
-              <a:t>29/06/2021</a:t>
+              <a:t>23/12/2024</a:t>
             </a:fld>
             <a:endParaRPr lang="en-GB"/>
           </a:p>
@@ -2888,7 +2888,7 @@
           <a:p>
             <a:fld id="{4B916772-B494-41CE-A259-ACCA1FC5E078}" type="datetimeFigureOut">
               <a:rPr lang="en-GB" smtClean="0"/>
-              <a:t>29/06/2021</a:t>
+              <a:t>23/12/2024</a:t>
             </a:fld>
             <a:endParaRPr lang="en-GB"/>
           </a:p>
@@ -3201,7 +3201,7 @@
           <a:p>
             <a:fld id="{4B916772-B494-41CE-A259-ACCA1FC5E078}" type="datetimeFigureOut">
               <a:rPr lang="en-GB" smtClean="0"/>
-              <a:t>29/06/2021</a:t>
+              <a:t>23/12/2024</a:t>
             </a:fld>
             <a:endParaRPr lang="en-GB"/>
           </a:p>
@@ -3394,7 +3394,7 @@
           <a:p>
             <a:fld id="{0B6C7CDF-7AA5-44C3-B1A8-9A6C0AE19615}" type="datetimeFigureOut">
               <a:rPr lang="en-GB" smtClean="0"/>
-              <a:t>29/06/2021</a:t>
+              <a:t>23/12/2024</a:t>
             </a:fld>
             <a:endParaRPr lang="en-GB"/>
           </a:p>
@@ -3671,7 +3671,7 @@
           <a:p>
             <a:fld id="{4B916772-B494-41CE-A259-ACCA1FC5E078}" type="datetimeFigureOut">
               <a:rPr lang="en-GB" smtClean="0"/>
-              <a:t>29/06/2021</a:t>
+              <a:t>23/12/2024</a:t>
             </a:fld>
             <a:endParaRPr lang="en-GB"/>
           </a:p>
@@ -3871,7 +3871,7 @@
           <a:p>
             <a:fld id="{4B916772-B494-41CE-A259-ACCA1FC5E078}" type="datetimeFigureOut">
               <a:rPr lang="en-GB" smtClean="0"/>
-              <a:t>29/06/2021</a:t>
+              <a:t>23/12/2024</a:t>
             </a:fld>
             <a:endParaRPr lang="en-GB"/>
           </a:p>
@@ -4081,7 +4081,7 @@
           <a:p>
             <a:fld id="{4B916772-B494-41CE-A259-ACCA1FC5E078}" type="datetimeFigureOut">
               <a:rPr lang="en-GB" smtClean="0"/>
-              <a:t>29/06/2021</a:t>
+              <a:t>23/12/2024</a:t>
             </a:fld>
             <a:endParaRPr lang="en-GB"/>
           </a:p>
@@ -4339,7 +4339,7 @@
           <a:p>
             <a:fld id="{0B6C7CDF-7AA5-44C3-B1A8-9A6C0AE19615}" type="datetimeFigureOut">
               <a:rPr lang="en-GB" smtClean="0"/>
-              <a:t>29/06/2021</a:t>
+              <a:t>23/12/2024</a:t>
             </a:fld>
             <a:endParaRPr lang="en-GB"/>
           </a:p>
@@ -4627,7 +4627,7 @@
           <a:p>
             <a:fld id="{0B6C7CDF-7AA5-44C3-B1A8-9A6C0AE19615}" type="datetimeFigureOut">
               <a:rPr lang="en-GB" smtClean="0"/>
-              <a:t>29/06/2021</a:t>
+              <a:t>23/12/2024</a:t>
             </a:fld>
             <a:endParaRPr lang="en-GB"/>
           </a:p>
@@ -5049,7 +5049,7 @@
           <a:p>
             <a:fld id="{0B6C7CDF-7AA5-44C3-B1A8-9A6C0AE19615}" type="datetimeFigureOut">
               <a:rPr lang="en-GB" smtClean="0"/>
-              <a:t>29/06/2021</a:t>
+              <a:t>23/12/2024</a:t>
             </a:fld>
             <a:endParaRPr lang="en-GB"/>
           </a:p>
@@ -5167,7 +5167,7 @@
           <a:p>
             <a:fld id="{0B6C7CDF-7AA5-44C3-B1A8-9A6C0AE19615}" type="datetimeFigureOut">
               <a:rPr lang="en-GB" smtClean="0"/>
-              <a:t>29/06/2021</a:t>
+              <a:t>23/12/2024</a:t>
             </a:fld>
             <a:endParaRPr lang="en-GB"/>
           </a:p>
@@ -5262,7 +5262,7 @@
           <a:p>
             <a:fld id="{0B6C7CDF-7AA5-44C3-B1A8-9A6C0AE19615}" type="datetimeFigureOut">
               <a:rPr lang="en-GB" smtClean="0"/>
-              <a:t>29/06/2021</a:t>
+              <a:t>23/12/2024</a:t>
             </a:fld>
             <a:endParaRPr lang="en-GB"/>
           </a:p>
@@ -5539,7 +5539,7 @@
           <a:p>
             <a:fld id="{0B6C7CDF-7AA5-44C3-B1A8-9A6C0AE19615}" type="datetimeFigureOut">
               <a:rPr lang="en-GB" smtClean="0"/>
-              <a:t>29/06/2021</a:t>
+              <a:t>23/12/2024</a:t>
             </a:fld>
             <a:endParaRPr lang="en-GB"/>
           </a:p>
@@ -5792,7 +5792,7 @@
           <a:p>
             <a:fld id="{0B6C7CDF-7AA5-44C3-B1A8-9A6C0AE19615}" type="datetimeFigureOut">
               <a:rPr lang="en-GB" smtClean="0"/>
-              <a:t>29/06/2021</a:t>
+              <a:t>23/12/2024</a:t>
             </a:fld>
             <a:endParaRPr lang="en-GB"/>
           </a:p>
@@ -6010,7 +6010,7 @@
           <a:p>
             <a:fld id="{0B6C7CDF-7AA5-44C3-B1A8-9A6C0AE19615}" type="datetimeFigureOut">
               <a:rPr lang="en-GB" smtClean="0"/>
-              <a:t>29/06/2021</a:t>
+              <a:t>23/12/2024</a:t>
             </a:fld>
             <a:endParaRPr lang="en-GB"/>
           </a:p>
@@ -6538,7 +6538,7 @@
           <a:p>
             <a:fld id="{4B916772-B494-41CE-A259-ACCA1FC5E078}" type="datetimeFigureOut">
               <a:rPr lang="en-GB" smtClean="0"/>
-              <a:t>29/06/2021</a:t>
+              <a:t>23/12/2024</a:t>
             </a:fld>
             <a:endParaRPr lang="en-GB"/>
           </a:p>
@@ -6973,7 +6973,7 @@
         </p:spPr>
         <p:txBody>
           <a:bodyPr>
-            <a:normAutofit fontScale="90000"/>
+            <a:normAutofit/>
           </a:bodyPr>
           <a:lstStyle/>
           <a:p>
@@ -6985,43 +6985,11 @@
               </a:rPr>
               <a:t>Git: The Basics</a:t>
             </a:r>
-            <a:br>
-              <a:rPr lang="en-GB" dirty="0">
-                <a:solidFill>
-                  <a:schemeClr val="bg1"/>
-                </a:solidFill>
-              </a:rPr>
-            </a:br>
-            <a:br>
-              <a:rPr lang="en-GB" dirty="0">
-                <a:solidFill>
-                  <a:schemeClr val="bg1"/>
-                </a:solidFill>
-              </a:rPr>
-            </a:br>
-            <a:r>
-              <a:rPr lang="en-GB" i="1" dirty="0">
-                <a:solidFill>
-                  <a:schemeClr val="bg1"/>
-                </a:solidFill>
-              </a:rPr>
-              <a:t>Facilitator: Victor Ordu</a:t>
-            </a:r>
-            <a:br>
-              <a:rPr lang="en-GB" i="1" dirty="0">
-                <a:solidFill>
-                  <a:schemeClr val="bg1"/>
-                </a:solidFill>
-              </a:rPr>
-            </a:br>
-            <a:r>
-              <a:rPr lang="en-GB" i="1" dirty="0">
-                <a:solidFill>
-                  <a:schemeClr val="bg1"/>
-                </a:solidFill>
-              </a:rPr>
-              <a:t>29 June 2021</a:t>
-            </a:r>
+            <a:endParaRPr lang="en-GB" i="1" dirty="0">
+              <a:solidFill>
+                <a:schemeClr val="bg1"/>
+              </a:solidFill>
+            </a:endParaRPr>
           </a:p>
         </p:txBody>
       </p:sp>
@@ -7101,12 +7069,21 @@
           <a:lstStyle/>
           <a:p>
             <a:r>
+              <a:rPr lang="en-GB" b="1" dirty="0">
+                <a:solidFill>
+                  <a:schemeClr val="bg1"/>
+                </a:solidFill>
+                <a:latin typeface="Consolas" panose="020B0609020204030204" pitchFamily="49" charset="0"/>
+              </a:rPr>
+              <a:t>git add</a:t>
+            </a:r>
+            <a:r>
               <a:rPr lang="en-GB" b="1" i="1" dirty="0">
                 <a:solidFill>
                   <a:schemeClr val="bg1"/>
                 </a:solidFill>
               </a:rPr>
-              <a:t>git add: </a:t>
+              <a:t>: </a:t>
             </a:r>
             <a:r>
               <a:rPr lang="en-GB" dirty="0">
@@ -7126,12 +7103,21 @@
           </a:p>
           <a:p>
             <a:r>
+              <a:rPr lang="en-GB" b="1" dirty="0">
+                <a:solidFill>
+                  <a:schemeClr val="bg1"/>
+                </a:solidFill>
+                <a:latin typeface="Consolas" panose="020B0609020204030204" pitchFamily="49" charset="0"/>
+              </a:rPr>
+              <a:t>git commit</a:t>
+            </a:r>
+            <a:r>
               <a:rPr lang="en-GB" b="1" i="1" dirty="0">
                 <a:solidFill>
                   <a:schemeClr val="bg1"/>
                 </a:solidFill>
               </a:rPr>
-              <a:t>git commit: </a:t>
+              <a:t>: </a:t>
             </a:r>
             <a:r>
               <a:rPr lang="en-GB" dirty="0">
@@ -7151,12 +7137,21 @@
           </a:p>
           <a:p>
             <a:r>
+              <a:rPr lang="en-GB" b="1" dirty="0">
+                <a:solidFill>
+                  <a:schemeClr val="bg1"/>
+                </a:solidFill>
+                <a:latin typeface="Consolas" panose="020B0609020204030204" pitchFamily="49" charset="0"/>
+              </a:rPr>
+              <a:t>git push</a:t>
+            </a:r>
+            <a:r>
               <a:rPr lang="en-GB" b="1" i="1" dirty="0">
                 <a:solidFill>
                   <a:schemeClr val="bg1"/>
                 </a:solidFill>
               </a:rPr>
-              <a:t>git push: </a:t>
+              <a:t>: </a:t>
             </a:r>
             <a:r>
               <a:rPr lang="en-GB" dirty="0">
@@ -7176,10 +7171,11 @@
           </a:p>
           <a:p>
             <a:r>
-              <a:rPr lang="en-GB" b="1" i="1" dirty="0">
-                <a:solidFill>
-                  <a:schemeClr val="bg1"/>
-                </a:solidFill>
+              <a:rPr lang="en-GB" b="1" dirty="0">
+                <a:solidFill>
+                  <a:schemeClr val="bg1"/>
+                </a:solidFill>
+                <a:latin typeface="Consolas" panose="020B0609020204030204" pitchFamily="49" charset="0"/>
               </a:rPr>
               <a:t>git pull</a:t>
             </a:r>
@@ -7252,6 +7248,7 @@
                 <a:solidFill>
                   <a:srgbClr val="C00000"/>
                 </a:solidFill>
+                <a:latin typeface="Consolas" panose="020B0609020204030204" pitchFamily="49" charset="0"/>
               </a:rPr>
               <a:t>git add</a:t>
             </a:r>
@@ -7354,6 +7351,7 @@
                 <a:solidFill>
                   <a:srgbClr val="C00000"/>
                 </a:solidFill>
+                <a:latin typeface="Consolas" panose="020B0609020204030204" pitchFamily="49" charset="0"/>
               </a:rPr>
               <a:t>git commit</a:t>
             </a:r>
@@ -7485,6 +7483,7 @@
                 <a:solidFill>
                   <a:srgbClr val="C00000"/>
                 </a:solidFill>
+                <a:latin typeface="Consolas" panose="020B0609020204030204" pitchFamily="49" charset="0"/>
               </a:rPr>
               <a:t>git push</a:t>
             </a:r>
@@ -7523,34 +7522,42 @@
                   <a:schemeClr val="bg1"/>
                 </a:solidFill>
               </a:rPr>
-              <a:t>This is usually at </a:t>
-            </a:r>
-            <a:r>
-              <a:rPr lang="en-GB" dirty="0" err="1">
-                <a:solidFill>
-                  <a:schemeClr val="bg1"/>
-                </a:solidFill>
-              </a:rPr>
-              <a:t>GitHub</a:t>
+              <a:t>This is commonly at GitHub (</a:t>
             </a:r>
             <a:r>
               <a:rPr lang="en-GB" dirty="0">
                 <a:solidFill>
                   <a:schemeClr val="bg1"/>
                 </a:solidFill>
-              </a:rPr>
-              <a:t>, but now exclusively so.</a:t>
-            </a:r>
-          </a:p>
-          <a:p>
+                <a:hlinkClick r:id="rId2"/>
+              </a:rPr>
+              <a:t>https://github.com</a:t>
+            </a:r>
             <a:r>
               <a:rPr lang="en-GB" dirty="0">
                 <a:solidFill>
                   <a:schemeClr val="bg1"/>
                 </a:solidFill>
               </a:rPr>
+              <a:t>), but not exclusively so.</a:t>
+            </a:r>
+          </a:p>
+          <a:p>
+            <a:r>
+              <a:rPr lang="en-GB" dirty="0">
+                <a:solidFill>
+                  <a:schemeClr val="bg1"/>
+                </a:solidFill>
+              </a:rPr>
               <a:t>You will need to use password authentication to push the changes.</a:t>
             </a:r>
+          </a:p>
+          <a:p>
+            <a:endParaRPr lang="en-GB" dirty="0">
+              <a:solidFill>
+                <a:schemeClr val="bg1"/>
+              </a:solidFill>
+            </a:endParaRPr>
           </a:p>
           <a:p>
             <a:r>
@@ -7614,6 +7621,7 @@
                 <a:solidFill>
                   <a:srgbClr val="C00000"/>
                 </a:solidFill>
+                <a:latin typeface="Consolas" panose="020B0609020204030204" pitchFamily="49" charset="0"/>
               </a:rPr>
               <a:t>git pull</a:t>
             </a:r>
@@ -7668,22 +7676,40 @@
           </a:p>
           <a:p>
             <a:r>
+              <a:rPr lang="en-GB" b="1" dirty="0">
+                <a:solidFill>
+                  <a:schemeClr val="bg1"/>
+                </a:solidFill>
+                <a:latin typeface="Consolas" panose="020B0609020204030204" pitchFamily="49" charset="0"/>
+              </a:rPr>
+              <a:t>git fetch</a:t>
+            </a:r>
+            <a:r>
               <a:rPr lang="en-GB" dirty="0">
                 <a:solidFill>
                   <a:schemeClr val="bg1"/>
                 </a:solidFill>
               </a:rPr>
-              <a:t>git fetch enables you to ‘collect’ changes found in the remote repo</a:t>
-            </a:r>
-          </a:p>
-          <a:p>
+              <a:t> enables you to ‘collect’ changes found in the remote repo</a:t>
+            </a:r>
+          </a:p>
+          <a:p>
+            <a:r>
+              <a:rPr lang="en-GB" b="1" dirty="0">
+                <a:solidFill>
+                  <a:schemeClr val="bg1"/>
+                </a:solidFill>
+                <a:latin typeface="Consolas" panose="020B0609020204030204" pitchFamily="49" charset="0"/>
+              </a:rPr>
+              <a:t>git merge</a:t>
+            </a:r>
             <a:r>
               <a:rPr lang="en-GB" dirty="0">
                 <a:solidFill>
                   <a:schemeClr val="bg1"/>
                 </a:solidFill>
               </a:rPr>
-              <a:t>git merge incorporates the changes into your repo (branch)</a:t>
+              <a:t> incorporates the changes into your repo (branch)</a:t>
             </a:r>
           </a:p>
         </p:txBody>
@@ -7773,18 +7799,20 @@
           <a:lstStyle/>
           <a:p>
             <a:r>
-              <a:rPr lang="en-GB" dirty="0">
-                <a:solidFill>
-                  <a:schemeClr val="bg1"/>
-                </a:solidFill>
+              <a:rPr lang="en-GB" b="1" dirty="0">
+                <a:solidFill>
+                  <a:schemeClr val="bg1"/>
+                </a:solidFill>
+                <a:latin typeface="Consolas" panose="020B0609020204030204" pitchFamily="49" charset="0"/>
               </a:rPr>
               <a:t>.</a:t>
             </a:r>
             <a:r>
-              <a:rPr lang="en-GB" dirty="0" err="1">
-                <a:solidFill>
-                  <a:schemeClr val="bg1"/>
-                </a:solidFill>
+              <a:rPr lang="en-GB" b="1" dirty="0" err="1">
+                <a:solidFill>
+                  <a:schemeClr val="bg1"/>
+                </a:solidFill>
+                <a:latin typeface="Consolas" panose="020B0609020204030204" pitchFamily="49" charset="0"/>
               </a:rPr>
               <a:t>gitignore</a:t>
             </a:r>
@@ -8005,7 +8033,7 @@
             </a:pPr>
             <a:r>
               <a:rPr lang="en-GB" dirty="0"/>
-              <a:t>Check the file contents  from Bash with </a:t>
+              <a:t>Check the file contents  with </a:t>
             </a:r>
             <a:r>
               <a:rPr lang="en-GB" sz="2600" dirty="0">
@@ -8201,8 +8229,119 @@
                 <a:solidFill>
                   <a:schemeClr val="bg1"/>
                 </a:solidFill>
-              </a:rPr>
-              <a:t>branch, reset, rebase, diff, mv, log, remote, …</a:t>
+                <a:latin typeface="Consolas" panose="020B0609020204030204" pitchFamily="49" charset="0"/>
+              </a:rPr>
+              <a:t>branch</a:t>
+            </a:r>
+            <a:r>
+              <a:rPr lang="en-GB" dirty="0">
+                <a:solidFill>
+                  <a:schemeClr val="bg1"/>
+                </a:solidFill>
+              </a:rPr>
+              <a:t>, </a:t>
+            </a:r>
+            <a:r>
+              <a:rPr lang="en-GB" dirty="0">
+                <a:solidFill>
+                  <a:schemeClr val="bg1"/>
+                </a:solidFill>
+                <a:latin typeface="Consolas" panose="020B0609020204030204" pitchFamily="49" charset="0"/>
+              </a:rPr>
+              <a:t>reset</a:t>
+            </a:r>
+            <a:r>
+              <a:rPr lang="en-GB" dirty="0">
+                <a:solidFill>
+                  <a:schemeClr val="bg1"/>
+                </a:solidFill>
+              </a:rPr>
+              <a:t>, </a:t>
+            </a:r>
+            <a:r>
+              <a:rPr lang="en-GB" dirty="0">
+                <a:solidFill>
+                  <a:schemeClr val="bg1"/>
+                </a:solidFill>
+                <a:latin typeface="Consolas" panose="020B0609020204030204" pitchFamily="49" charset="0"/>
+              </a:rPr>
+              <a:t>rebase</a:t>
+            </a:r>
+            <a:r>
+              <a:rPr lang="en-GB" dirty="0">
+                <a:solidFill>
+                  <a:schemeClr val="bg1"/>
+                </a:solidFill>
+              </a:rPr>
+              <a:t>, </a:t>
+            </a:r>
+            <a:r>
+              <a:rPr lang="en-GB" dirty="0">
+                <a:solidFill>
+                  <a:schemeClr val="bg1"/>
+                </a:solidFill>
+                <a:latin typeface="Consolas" panose="020B0609020204030204" pitchFamily="49" charset="0"/>
+              </a:rPr>
+              <a:t>diff</a:t>
+            </a:r>
+            <a:r>
+              <a:rPr lang="en-GB" dirty="0">
+                <a:solidFill>
+                  <a:schemeClr val="bg1"/>
+                </a:solidFill>
+              </a:rPr>
+              <a:t>, </a:t>
+            </a:r>
+            <a:r>
+              <a:rPr lang="en-GB" dirty="0">
+                <a:solidFill>
+                  <a:schemeClr val="bg1"/>
+                </a:solidFill>
+                <a:latin typeface="Consolas" panose="020B0609020204030204" pitchFamily="49" charset="0"/>
+              </a:rPr>
+              <a:t>mv</a:t>
+            </a:r>
+            <a:r>
+              <a:rPr lang="en-GB" dirty="0">
+                <a:solidFill>
+                  <a:schemeClr val="bg1"/>
+                </a:solidFill>
+              </a:rPr>
+              <a:t>, </a:t>
+            </a:r>
+            <a:r>
+              <a:rPr lang="en-GB" dirty="0">
+                <a:solidFill>
+                  <a:schemeClr val="bg1"/>
+                </a:solidFill>
+                <a:latin typeface="Consolas" panose="020B0609020204030204" pitchFamily="49" charset="0"/>
+              </a:rPr>
+              <a:t>log</a:t>
+            </a:r>
+            <a:r>
+              <a:rPr lang="en-GB" dirty="0">
+                <a:solidFill>
+                  <a:schemeClr val="bg1"/>
+                </a:solidFill>
+              </a:rPr>
+              <a:t>, </a:t>
+            </a:r>
+            <a:r>
+              <a:rPr lang="en-GB" dirty="0">
+                <a:solidFill>
+                  <a:schemeClr val="bg1"/>
+                </a:solidFill>
+                <a:latin typeface="Consolas" panose="020B0609020204030204" pitchFamily="49" charset="0"/>
+              </a:rPr>
+              <a:t>remote</a:t>
+            </a:r>
+            <a:r>
+              <a:rPr lang="en-GB" dirty="0">
+                <a:solidFill>
+                  <a:schemeClr val="bg1"/>
+                </a:solidFill>
+              </a:rPr>
+              <a:t>, …</a:t>
             </a:r>
           </a:p>
           <a:p>
@@ -9984,7 +10123,7 @@
         <p:spPr/>
         <p:txBody>
           <a:bodyPr>
-            <a:normAutofit fontScale="70000" lnSpcReduction="20000"/>
+            <a:normAutofit fontScale="77500" lnSpcReduction="20000"/>
           </a:bodyPr>
           <a:lstStyle/>
           <a:p>
@@ -10069,7 +10208,24 @@
                   <a:schemeClr val="bg1"/>
                 </a:solidFill>
               </a:rPr>
-              <a:t>Change directory (cd)</a:t>
+              <a:t>Change directory (</a:t>
+            </a:r>
+            <a:r>
+              <a:rPr lang="en-GB" dirty="0">
+                <a:solidFill>
+                  <a:schemeClr val="bg1"/>
+                </a:solidFill>
+                <a:latin typeface="Consolas" panose="020B0609020204030204" pitchFamily="49" charset="0"/>
+              </a:rPr>
+              <a:t>cd</a:t>
+            </a:r>
+            <a:r>
+              <a:rPr lang="en-GB" dirty="0">
+                <a:solidFill>
+                  <a:schemeClr val="bg1"/>
+                </a:solidFill>
+              </a:rPr>
+              <a:t>)</a:t>
             </a:r>
           </a:p>
           <a:p>
@@ -10080,7 +10236,24 @@
                   <a:schemeClr val="bg1"/>
                 </a:solidFill>
               </a:rPr>
-              <a:t>Check directory contents (ls)</a:t>
+              <a:t>Check directory contents (</a:t>
+            </a:r>
+            <a:r>
+              <a:rPr lang="en-GB" dirty="0">
+                <a:solidFill>
+                  <a:schemeClr val="bg1"/>
+                </a:solidFill>
+                <a:latin typeface="Consolas" panose="020B0609020204030204" pitchFamily="49" charset="0"/>
+              </a:rPr>
+              <a:t>ls</a:t>
+            </a:r>
+            <a:r>
+              <a:rPr lang="en-GB" dirty="0">
+                <a:solidFill>
+                  <a:schemeClr val="bg1"/>
+                </a:solidFill>
+              </a:rPr>
+              <a:t>)</a:t>
             </a:r>
           </a:p>
           <a:p>
@@ -10091,7 +10264,24 @@
                   <a:schemeClr val="bg1"/>
                 </a:solidFill>
               </a:rPr>
-              <a:t>Delete a file (rm)</a:t>
+              <a:t>Delete a file (</a:t>
+            </a:r>
+            <a:r>
+              <a:rPr lang="en-GB" dirty="0">
+                <a:solidFill>
+                  <a:schemeClr val="bg1"/>
+                </a:solidFill>
+                <a:latin typeface="Consolas" panose="020B0609020204030204" pitchFamily="49" charset="0"/>
+              </a:rPr>
+              <a:t>rm</a:t>
+            </a:r>
+            <a:r>
+              <a:rPr lang="en-GB" dirty="0">
+                <a:solidFill>
+                  <a:schemeClr val="bg1"/>
+                </a:solidFill>
+              </a:rPr>
+              <a:t>)</a:t>
             </a:r>
           </a:p>
           <a:p>
@@ -10109,6 +10299,7 @@
                 <a:solidFill>
                   <a:schemeClr val="bg1"/>
                 </a:solidFill>
+                <a:latin typeface="Consolas" panose="020B0609020204030204" pitchFamily="49" charset="0"/>
               </a:rPr>
               <a:t>cp</a:t>
             </a:r>
@@ -10129,7 +10320,24 @@
                   <a:schemeClr val="bg1"/>
                 </a:solidFill>
               </a:rPr>
-              <a:t>Write to file (echo, cat)</a:t>
+              <a:t>Write to file (</a:t>
+            </a:r>
+            <a:r>
+              <a:rPr lang="en-GB" dirty="0">
+                <a:solidFill>
+                  <a:schemeClr val="bg1"/>
+                </a:solidFill>
+                <a:latin typeface="Consolas" panose="020B0609020204030204" pitchFamily="49" charset="0"/>
+              </a:rPr>
+              <a:t>echo</a:t>
+            </a:r>
+            <a:r>
+              <a:rPr lang="en-GB" dirty="0">
+                <a:solidFill>
+                  <a:schemeClr val="bg1"/>
+                </a:solidFill>
+              </a:rPr>
+              <a:t>)</a:t>
             </a:r>
           </a:p>
           <a:p>
@@ -10140,17 +10348,34 @@
                   <a:schemeClr val="bg1"/>
                 </a:solidFill>
               </a:rPr>
-              <a:t>Read a file (various commands)</a:t>
-            </a:r>
-          </a:p>
-          <a:p>
+              <a:t>Read a file (</a:t>
+            </a:r>
             <a:r>
               <a:rPr lang="en-GB" dirty="0">
                 <a:solidFill>
                   <a:schemeClr val="bg1"/>
                 </a:solidFill>
-              </a:rPr>
-              <a:t>You can still use GUI-based folder management (at the beginning) but this is really cumbersome and time-consuming.</a:t>
+                <a:latin typeface="Consolas" panose="020B0609020204030204" pitchFamily="49" charset="0"/>
+              </a:rPr>
+              <a:t>cat</a:t>
+            </a:r>
+            <a:r>
+              <a:rPr lang="en-GB" dirty="0">
+                <a:solidFill>
+                  <a:schemeClr val="bg1"/>
+                </a:solidFill>
+              </a:rPr>
+              <a:t>)</a:t>
+            </a:r>
+          </a:p>
+          <a:p>
+            <a:r>
+              <a:rPr lang="en-GB" dirty="0">
+                <a:solidFill>
+                  <a:schemeClr val="bg1"/>
+                </a:solidFill>
+              </a:rPr>
+              <a:t>You can still use GUI-based folder management (at the beginning) but this is cumbersome and time-consuming.</a:t>
             </a:r>
           </a:p>
         </p:txBody>
@@ -10259,17 +10484,35 @@
                   <a:schemeClr val="bg1"/>
                 </a:solidFill>
               </a:rPr>
-              <a:t>Type and run git</a:t>
-            </a:r>
-          </a:p>
-          <a:p>
+              <a:t>Type and run </a:t>
+            </a:r>
             <a:r>
               <a:rPr lang="en-GB" dirty="0">
                 <a:solidFill>
                   <a:schemeClr val="bg1"/>
                 </a:solidFill>
-              </a:rPr>
-              <a:t>Now try git help</a:t>
+                <a:latin typeface="Consolas" panose="020B0609020204030204" pitchFamily="49" charset="0"/>
+              </a:rPr>
+              <a:t>git</a:t>
+            </a:r>
+          </a:p>
+          <a:p>
+            <a:r>
+              <a:rPr lang="en-GB" dirty="0">
+                <a:solidFill>
+                  <a:schemeClr val="bg1"/>
+                </a:solidFill>
+              </a:rPr>
+              <a:t>Now try </a:t>
+            </a:r>
+            <a:r>
+              <a:rPr lang="en-GB" dirty="0">
+                <a:solidFill>
+                  <a:schemeClr val="bg1"/>
+                </a:solidFill>
+                <a:latin typeface="Consolas" panose="020B0609020204030204" pitchFamily="49" charset="0"/>
+              </a:rPr>
+              <a:t>git help</a:t>
             </a:r>
           </a:p>
           <a:p>
@@ -10372,82 +10615,6 @@
             </a:r>
           </a:p>
           <a:p>
-            <a:r>
-              <a:rPr lang="en-GB" dirty="0">
-                <a:solidFill>
-                  <a:schemeClr val="bg1"/>
-                </a:solidFill>
-              </a:rPr>
-              <a:t>Let try something out:</a:t>
-            </a:r>
-          </a:p>
-          <a:p>
-            <a:pPr lvl="1"/>
-            <a:r>
-              <a:rPr lang="en-GB" dirty="0">
-                <a:solidFill>
-                  <a:schemeClr val="bg1"/>
-                </a:solidFill>
-              </a:rPr>
-              <a:t>Create and open a blank folder called </a:t>
-            </a:r>
-            <a:r>
-              <a:rPr lang="en-GB" dirty="0" err="1">
-                <a:solidFill>
-                  <a:schemeClr val="bg1"/>
-                </a:solidFill>
-              </a:rPr>
-              <a:t>GitLesson</a:t>
-            </a:r>
-            <a:r>
-              <a:rPr lang="en-GB" dirty="0">
-                <a:solidFill>
-                  <a:schemeClr val="bg1"/>
-                </a:solidFill>
-              </a:rPr>
-              <a:t> in your favourite GUI e.g. Windows Explorer</a:t>
-            </a:r>
-          </a:p>
-          <a:p>
-            <a:pPr lvl="1"/>
-            <a:r>
-              <a:rPr lang="en-GB" dirty="0">
-                <a:solidFill>
-                  <a:schemeClr val="bg1"/>
-                </a:solidFill>
-              </a:rPr>
-              <a:t>Open the CLI and navigate to that folder/directory</a:t>
-            </a:r>
-          </a:p>
-          <a:p>
-            <a:pPr lvl="1"/>
-            <a:r>
-              <a:rPr lang="en-GB" dirty="0">
-                <a:solidFill>
-                  <a:schemeClr val="bg1"/>
-                </a:solidFill>
-              </a:rPr>
-              <a:t>Start Git and make sure its running</a:t>
-            </a:r>
-          </a:p>
-          <a:p>
-            <a:pPr lvl="1"/>
-            <a:r>
-              <a:rPr lang="en-GB" dirty="0">
-                <a:solidFill>
-                  <a:schemeClr val="bg1"/>
-                </a:solidFill>
-              </a:rPr>
-              <a:t>Run this command: git </a:t>
-            </a:r>
-            <a:r>
-              <a:rPr lang="en-GB" dirty="0" err="1">
-                <a:solidFill>
-                  <a:schemeClr val="bg1"/>
-                </a:solidFill>
-              </a:rPr>
-              <a:t>init</a:t>
-            </a:r>
             <a:endParaRPr lang="en-GB" dirty="0">
               <a:solidFill>
                 <a:schemeClr val="bg1"/>
@@ -10455,6 +10622,16 @@
             </a:endParaRPr>
           </a:p>
           <a:p>
+            <a:r>
+              <a:rPr lang="en-GB" dirty="0">
+                <a:solidFill>
+                  <a:schemeClr val="bg1"/>
+                </a:solidFill>
+              </a:rPr>
+              <a:t>Let’s try something out:</a:t>
+            </a:r>
+          </a:p>
+          <a:p>
             <a:pPr lvl="1"/>
             <a:r>
               <a:rPr lang="en-GB" dirty="0">
@@ -10462,8 +10639,87 @@
                   <a:schemeClr val="bg1"/>
                 </a:solidFill>
               </a:rPr>
-              <a:t>Look at your GUI. What did you notice?</a:t>
-            </a:r>
+              <a:t>Create a new directory called </a:t>
+            </a:r>
+            <a:r>
+              <a:rPr lang="en-GB" dirty="0" err="1">
+                <a:solidFill>
+                  <a:schemeClr val="bg1"/>
+                </a:solidFill>
+              </a:rPr>
+              <a:t>GitLesson</a:t>
+            </a:r>
+            <a:r>
+              <a:rPr lang="en-GB" dirty="0">
+                <a:solidFill>
+                  <a:schemeClr val="bg1"/>
+                </a:solidFill>
+              </a:rPr>
+              <a:t> </a:t>
+            </a:r>
+          </a:p>
+          <a:p>
+            <a:pPr lvl="1"/>
+            <a:r>
+              <a:rPr lang="en-GB" dirty="0">
+                <a:solidFill>
+                  <a:schemeClr val="bg1"/>
+                </a:solidFill>
+              </a:rPr>
+              <a:t>Check the contents</a:t>
+            </a:r>
+          </a:p>
+          <a:p>
+            <a:pPr lvl="1"/>
+            <a:r>
+              <a:rPr lang="en-GB" dirty="0">
+                <a:solidFill>
+                  <a:schemeClr val="bg1"/>
+                </a:solidFill>
+              </a:rPr>
+              <a:t>Run this command: </a:t>
+            </a:r>
+            <a:r>
+              <a:rPr lang="en-GB" dirty="0">
+                <a:solidFill>
+                  <a:schemeClr val="bg1"/>
+                </a:solidFill>
+                <a:latin typeface="Consolas" panose="020B0609020204030204" pitchFamily="49" charset="0"/>
+              </a:rPr>
+              <a:t>git </a:t>
+            </a:r>
+            <a:r>
+              <a:rPr lang="en-GB" dirty="0" err="1">
+                <a:solidFill>
+                  <a:schemeClr val="bg1"/>
+                </a:solidFill>
+                <a:latin typeface="Consolas" panose="020B0609020204030204" pitchFamily="49" charset="0"/>
+              </a:rPr>
+              <a:t>init</a:t>
+            </a:r>
+            <a:endParaRPr lang="en-GB" dirty="0">
+              <a:solidFill>
+                <a:schemeClr val="bg1"/>
+              </a:solidFill>
+              <a:latin typeface="Consolas" panose="020B0609020204030204" pitchFamily="49" charset="0"/>
+            </a:endParaRPr>
+          </a:p>
+          <a:p>
+            <a:pPr lvl="1"/>
+            <a:r>
+              <a:rPr lang="en-GB" dirty="0">
+                <a:solidFill>
+                  <a:schemeClr val="bg1"/>
+                </a:solidFill>
+                <a:latin typeface="Consolas" panose="020B0609020204030204" pitchFamily="49" charset="0"/>
+              </a:rPr>
+              <a:t>Check the contents again. What do you notice?</a:t>
+            </a:r>
+            <a:endParaRPr lang="en-GB" dirty="0">
+              <a:solidFill>
+                <a:schemeClr val="bg1"/>
+              </a:solidFill>
+            </a:endParaRPr>
           </a:p>
           <a:p>
             <a:endParaRPr lang="en-GB" dirty="0">
@@ -10553,6 +10809,13 @@
               </a:rPr>
               <a:t>Git essentially takes snapshots of files in the repo.</a:t>
             </a:r>
+          </a:p>
+          <a:p>
+            <a:endParaRPr lang="en-GB" dirty="0">
+              <a:solidFill>
+                <a:schemeClr val="bg1"/>
+              </a:solidFill>
+            </a:endParaRPr>
           </a:p>
           <a:p>
             <a:r>

</xml_diff>